<commit_message>
Aggiunta un'altra difficolta e un'altro dubbio
Aggiunta un'altra difficolta e un'altro dubbio
</commit_message>
<xml_diff>
--- a/DIARIO DI BORDO/DB-10-11-25.pptx
+++ b/DIARIO DI BORDO/DB-10-11-25.pptx
@@ -4249,8 +4249,8 @@
         </p:nvSpPr>
         <p:spPr>
           <a:xfrm>
-            <a:off x="899868" y="2541891"/>
-            <a:ext cx="15773400" cy="6358279"/>
+            <a:off x="533400" y="2546569"/>
+            <a:ext cx="15773400" cy="6612195"/>
           </a:xfrm>
           <a:prstGeom prst="rect">
             <a:avLst/>
@@ -4271,7 +4271,7 @@
               <a:buChar char="Ø"/>
             </a:pPr>
             <a:r>
-              <a:rPr lang="it-IT" sz="3500" dirty="0">
+              <a:rPr lang="it-IT" sz="3200" dirty="0">
                 <a:solidFill>
                   <a:srgbClr val="000000"/>
                 </a:solidFill>
@@ -4280,7 +4280,7 @@
                 <a:cs typeface="Arial" panose="020B0604020202020204" pitchFamily="34" charset="0"/>
                 <a:sym typeface="Overpass"/>
               </a:rPr>
-              <a:t>Pianificazione rotazione ruoli: pianificare una rotazione ragionevole che permetta di allinearci con gli sprint dell’azienda.</a:t>
+              <a:t> Pianificazione della rotazione dei ruoli: pianificare un sistema di rotazione ragionevole dei ruoli che permetta di allinearci con gli sprint dell’azienda.</a:t>
             </a:r>
           </a:p>
           <a:p>
@@ -4292,7 +4292,7 @@
               <a:buChar char="Ø"/>
             </a:pPr>
             <a:r>
-              <a:rPr lang="it-IT" sz="3500" noProof="0" dirty="0">
+              <a:rPr lang="it-IT" sz="3200" noProof="0" dirty="0">
                 <a:solidFill>
                   <a:srgbClr val="000000"/>
                 </a:solidFill>
@@ -4301,7 +4301,7 @@
                 <a:cs typeface="Arial" panose="020B0604020202020204" pitchFamily="34" charset="0"/>
                 <a:sym typeface="Overpass"/>
               </a:rPr>
-              <a:t>Organizzare tempo universitario e tempo dedicato al progetto.</a:t>
+              <a:t> Gestione del tempo: Bilanciare impegni universitari e attività progettuali.</a:t>
             </a:r>
           </a:p>
           <a:p>
@@ -4313,7 +4313,7 @@
               <a:buChar char="Ø"/>
             </a:pPr>
             <a:r>
-              <a:rPr lang="it-IT" sz="3500" dirty="0">
+              <a:rPr lang="it-IT" sz="3200" dirty="0">
                 <a:solidFill>
                   <a:srgbClr val="000000"/>
                 </a:solidFill>
@@ -4322,7 +4322,7 @@
                 <a:cs typeface="Arial" panose="020B0604020202020204" pitchFamily="34" charset="0"/>
                 <a:sym typeface="Overpass"/>
               </a:rPr>
-              <a:t>Ripianificazione del sito e renderlo accessibile secondo le nostre conoscenze.</a:t>
+              <a:t> Riprogettazione del sito e renderlo accessibile secondo le nostre conoscenze.</a:t>
             </a:r>
           </a:p>
           <a:p>
@@ -4334,7 +4334,7 @@
               <a:buChar char="Ø"/>
             </a:pPr>
             <a:r>
-              <a:rPr lang="it-IT" sz="3500" dirty="0">
+              <a:rPr lang="it-IT" sz="3200" dirty="0">
                 <a:solidFill>
                   <a:srgbClr val="000000"/>
                 </a:solidFill>
@@ -4343,7 +4343,28 @@
                 <a:cs typeface="Arial" panose="020B0604020202020204" pitchFamily="34" charset="0"/>
                 <a:sym typeface="Overpass"/>
               </a:rPr>
-              <a:t>Sviluppare un workflow efficace ed efficiente per i documenti che permetta di controllarli e rilasciarli in produzione solo quando sono approvati.</a:t>
+              <a:t> Sviluppare un workflow efficace ed efficiente per i documenti che permetta di controllarli e rilasciarli in produzione solo quando sono approvati.</a:t>
+            </a:r>
+          </a:p>
+          <a:p>
+            <a:pPr marL="587428" lvl="1" indent="-342900">
+              <a:lnSpc>
+                <a:spcPct val="150000"/>
+              </a:lnSpc>
+              <a:buFont typeface="Wingdings" panose="05000000000000000000" pitchFamily="2" charset="2"/>
+              <a:buChar char="Ø"/>
+            </a:pPr>
+            <a:r>
+              <a:rPr lang="it-IT" sz="3200" dirty="0">
+                <a:solidFill>
+                  <a:srgbClr val="000000"/>
+                </a:solidFill>
+                <a:latin typeface="Overpass"/>
+                <a:ea typeface="Overpass"/>
+                <a:cs typeface="Arial" panose="020B0604020202020204" pitchFamily="34" charset="0"/>
+                <a:sym typeface="Overpass"/>
+              </a:rPr>
+              <a:t> Tracciamento delle attività non direttamente collegate alla documentazione (Studio delle tecnologie)</a:t>
             </a:r>
           </a:p>
           <a:p>
@@ -4464,9 +4485,9 @@
         <p:grpSpPr>
           <a:xfrm>
             <a:off x="207205" y="186979"/>
-            <a:ext cx="19668373" cy="7290141"/>
+            <a:ext cx="19668373" cy="6690686"/>
             <a:chOff x="0" y="-16005"/>
-            <a:chExt cx="26224497" cy="9720186"/>
+            <a:chExt cx="26224497" cy="8920913"/>
           </a:xfrm>
         </p:grpSpPr>
         <p:sp>
@@ -4477,7 +4498,7 @@
           </p:nvSpPr>
           <p:spPr>
             <a:xfrm>
-              <a:off x="638127" y="4445562"/>
+              <a:off x="638127" y="3646289"/>
               <a:ext cx="20145326" cy="5258619"/>
             </a:xfrm>
             <a:prstGeom prst="rect">
@@ -4594,17 +4615,8 @@
                   <a:cs typeface="Overpass"/>
                   <a:sym typeface="Overpass"/>
                 </a:rPr>
-                <a:t>Come gestire gli sprint e come approcciarsi alle nuove tecnologie?</a:t>
+                <a:t>Come gestire e organizzare gli sprint in modo ottimale? </a:t>
               </a:r>
-              <a:endParaRPr lang="it-IT" sz="3500" noProof="0" dirty="0">
-                <a:solidFill>
-                  <a:srgbClr val="000000"/>
-                </a:solidFill>
-                <a:latin typeface="Overpass"/>
-                <a:ea typeface="Overpass"/>
-                <a:cs typeface="Overpass"/>
-                <a:sym typeface="Overpass"/>
-              </a:endParaRPr>
             </a:p>
             <a:p>
               <a:pPr marL="988744" lvl="1" indent="-571500" algn="l">
@@ -4614,6 +4626,30 @@
                 <a:buFont typeface="Wingdings" panose="05000000000000000000" pitchFamily="2" charset="2"/>
                 <a:buChar char="Ø"/>
               </a:pPr>
+              <a:r>
+                <a:rPr lang="it-IT" sz="3500" dirty="0">
+                  <a:solidFill>
+                    <a:srgbClr val="000000"/>
+                  </a:solidFill>
+                  <a:latin typeface="Overpass"/>
+                  <a:ea typeface="Overpass"/>
+                  <a:cs typeface="Overpass"/>
+                  <a:sym typeface="Overpass"/>
+                </a:rPr>
+                <a:t>Quale approccio adottare per apprendere </a:t>
+              </a:r>
+              <a:r>
+                <a:rPr lang="it-IT" sz="3500">
+                  <a:solidFill>
+                    <a:srgbClr val="000000"/>
+                  </a:solidFill>
+                  <a:latin typeface="Overpass"/>
+                  <a:ea typeface="Overpass"/>
+                  <a:cs typeface="Overpass"/>
+                  <a:sym typeface="Overpass"/>
+                </a:rPr>
+                <a:t>nuove tecnologie</a:t>
+              </a:r>
               <a:endParaRPr lang="it-IT" sz="3500" noProof="0" dirty="0">
                 <a:solidFill>
                   <a:srgbClr val="000000"/>
@@ -4635,7 +4671,7 @@
           <p:spPr>
             <a:xfrm>
               <a:off x="0" y="-16005"/>
-              <a:ext cx="26224497" cy="2455031"/>
+              <a:ext cx="26224497" cy="2370734"/>
             </a:xfrm>
             <a:prstGeom prst="rect">
               <a:avLst/>
@@ -4653,7 +4689,7 @@
                 </a:lnSpc>
               </a:pPr>
               <a:r>
-                <a:rPr lang="it-IT" sz="12000" b="1" noProof="0" dirty="0">
+                <a:rPr lang="it-IT" sz="9600" b="1" noProof="0" dirty="0">
                   <a:solidFill>
                     <a:srgbClr val="000000"/>
                   </a:solidFill>
@@ -4662,7 +4698,7 @@
                   <a:cs typeface="Fredoka"/>
                   <a:sym typeface="Fredoka"/>
                 </a:rPr>
-                <a:t>DUBBI</a:t>
+                <a:t>DUBBI SU COME PROCEDERE</a:t>
               </a:r>
             </a:p>
           </p:txBody>

</xml_diff>

<commit_message>
Aggiunyo diario di bordo per lunedi e cambiati gli accenti negli altri 2
</commit_message>
<xml_diff>
--- a/DIARIO DI BORDO/DB-10-11-25.pptx
+++ b/DIARIO DI BORDO/DB-10-11-25.pptx
@@ -232,7 +232,7 @@
           <a:p>
             <a:fld id="{DC233B30-4F8C-4A4C-AB5E-3B02323E36F5}" type="datetimeFigureOut">
               <a:rPr lang="it-IT" smtClean="0"/>
-              <a:t>10/11/2025</a:t>
+              <a:t>14/11/2025</a:t>
             </a:fld>
             <a:endParaRPr lang="it-IT"/>
           </a:p>
@@ -763,7 +763,7 @@
             <a:fld id="{1D8BD707-D9CF-40AE-B4C6-C98DA3205C09}" type="datetimeFigureOut">
               <a:rPr lang="en-US" smtClean="0"/>
               <a:pPr/>
-              <a:t>11/10/2025</a:t>
+              <a:t>11/14/2025</a:t>
             </a:fld>
             <a:endParaRPr lang="en-US"/>
           </a:p>
@@ -928,7 +928,7 @@
             <a:fld id="{1D8BD707-D9CF-40AE-B4C6-C98DA3205C09}" type="datetimeFigureOut">
               <a:rPr lang="en-US" smtClean="0"/>
               <a:pPr/>
-              <a:t>11/10/2025</a:t>
+              <a:t>11/14/2025</a:t>
             </a:fld>
             <a:endParaRPr lang="en-US"/>
           </a:p>
@@ -1103,7 +1103,7 @@
             <a:fld id="{1D8BD707-D9CF-40AE-B4C6-C98DA3205C09}" type="datetimeFigureOut">
               <a:rPr lang="en-US" smtClean="0"/>
               <a:pPr/>
-              <a:t>11/10/2025</a:t>
+              <a:t>11/14/2025</a:t>
             </a:fld>
             <a:endParaRPr lang="en-US"/>
           </a:p>
@@ -1268,7 +1268,7 @@
             <a:fld id="{1D8BD707-D9CF-40AE-B4C6-C98DA3205C09}" type="datetimeFigureOut">
               <a:rPr lang="en-US" smtClean="0"/>
               <a:pPr/>
-              <a:t>11/10/2025</a:t>
+              <a:t>11/14/2025</a:t>
             </a:fld>
             <a:endParaRPr lang="en-US"/>
           </a:p>
@@ -1510,7 +1510,7 @@
             <a:fld id="{1D8BD707-D9CF-40AE-B4C6-C98DA3205C09}" type="datetimeFigureOut">
               <a:rPr lang="en-US" smtClean="0"/>
               <a:pPr/>
-              <a:t>11/10/2025</a:t>
+              <a:t>11/14/2025</a:t>
             </a:fld>
             <a:endParaRPr lang="en-US"/>
           </a:p>
@@ -1792,7 +1792,7 @@
             <a:fld id="{1D8BD707-D9CF-40AE-B4C6-C98DA3205C09}" type="datetimeFigureOut">
               <a:rPr lang="en-US" smtClean="0"/>
               <a:pPr/>
-              <a:t>11/10/2025</a:t>
+              <a:t>11/14/2025</a:t>
             </a:fld>
             <a:endParaRPr lang="en-US"/>
           </a:p>
@@ -2208,7 +2208,7 @@
             <a:fld id="{1D8BD707-D9CF-40AE-B4C6-C98DA3205C09}" type="datetimeFigureOut">
               <a:rPr lang="en-US" smtClean="0"/>
               <a:pPr/>
-              <a:t>11/10/2025</a:t>
+              <a:t>11/14/2025</a:t>
             </a:fld>
             <a:endParaRPr lang="en-US"/>
           </a:p>
@@ -2322,7 +2322,7 @@
             <a:fld id="{1D8BD707-D9CF-40AE-B4C6-C98DA3205C09}" type="datetimeFigureOut">
               <a:rPr lang="en-US" smtClean="0"/>
               <a:pPr/>
-              <a:t>11/10/2025</a:t>
+              <a:t>11/14/2025</a:t>
             </a:fld>
             <a:endParaRPr lang="en-US"/>
           </a:p>
@@ -2414,7 +2414,7 @@
             <a:fld id="{1D8BD707-D9CF-40AE-B4C6-C98DA3205C09}" type="datetimeFigureOut">
               <a:rPr lang="en-US" smtClean="0"/>
               <a:pPr/>
-              <a:t>11/10/2025</a:t>
+              <a:t>11/14/2025</a:t>
             </a:fld>
             <a:endParaRPr lang="en-US"/>
           </a:p>
@@ -2686,7 +2686,7 @@
             <a:fld id="{1D8BD707-D9CF-40AE-B4C6-C98DA3205C09}" type="datetimeFigureOut">
               <a:rPr lang="en-US" smtClean="0"/>
               <a:pPr/>
-              <a:t>11/10/2025</a:t>
+              <a:t>11/14/2025</a:t>
             </a:fld>
             <a:endParaRPr lang="en-US"/>
           </a:p>
@@ -2935,7 +2935,7 @@
             <a:fld id="{1D8BD707-D9CF-40AE-B4C6-C98DA3205C09}" type="datetimeFigureOut">
               <a:rPr lang="en-US" smtClean="0"/>
               <a:pPr/>
-              <a:t>11/10/2025</a:t>
+              <a:t>11/14/2025</a:t>
             </a:fld>
             <a:endParaRPr lang="en-US"/>
           </a:p>
@@ -3143,7 +3143,7 @@
             <a:fld id="{1D8BD707-D9CF-40AE-B4C6-C98DA3205C09}" type="datetimeFigureOut">
               <a:rPr lang="en-US" smtClean="0"/>
               <a:pPr/>
-              <a:t>11/10/2025</a:t>
+              <a:t>11/14/2025</a:t>
             </a:fld>
             <a:endParaRPr lang="en-US"/>
           </a:p>
@@ -4220,6 +4220,18 @@
                 </a:lnSpc>
               </a:pPr>
               <a:r>
+                <a:rPr lang="it-IT" sz="10000" b="1" noProof="0">
+                  <a:solidFill>
+                    <a:srgbClr val="000000"/>
+                  </a:solidFill>
+                  <a:latin typeface="Goudy" panose="020B0604020202020204" charset="0"/>
+                  <a:ea typeface="Fredoka"/>
+                  <a:cs typeface="Fredoka"/>
+                  <a:sym typeface="Fredoka"/>
+                </a:rPr>
+                <a:t>DIFFICOLTÀ </a:t>
+              </a:r>
+              <a:r>
                 <a:rPr lang="it-IT" sz="10000" b="1" noProof="0" dirty="0">
                   <a:solidFill>
                     <a:srgbClr val="000000"/>
@@ -4229,7 +4241,7 @@
                   <a:cs typeface="Fredoka"/>
                   <a:sym typeface="Fredoka"/>
                 </a:rPr>
-                <a:t>DIFFICOLTÁ INCONTRATE</a:t>
+                <a:t>INCONTRATE</a:t>
               </a:r>
             </a:p>
           </p:txBody>

</xml_diff>